<commit_message>
Introdução do slide de resumo + teste de comit
</commit_message>
<xml_diff>
--- a/Artigos Apresentados/SBGames2017_Onthology.pptx
+++ b/Artigos Apresentados/SBGames2017_Onthology.pptx
@@ -5,40 +5,23 @@
     <p:sldMasterId id="2147483685" r:id="rId1"/>
   </p:sldMasterIdLst>
   <p:notesMasterIdLst>
-    <p:notesMasterId r:id="rId12"/>
+    <p:notesMasterId r:id="rId13"/>
   </p:notesMasterIdLst>
   <p:sldIdLst>
     <p:sldId id="256" r:id="rId2"/>
     <p:sldId id="333" r:id="rId3"/>
-    <p:sldId id="335" r:id="rId4"/>
-    <p:sldId id="336" r:id="rId5"/>
-    <p:sldId id="337" r:id="rId6"/>
-    <p:sldId id="338" r:id="rId7"/>
-    <p:sldId id="339" r:id="rId8"/>
-    <p:sldId id="340" r:id="rId9"/>
-    <p:sldId id="341" r:id="rId10"/>
-    <p:sldId id="331" r:id="rId11"/>
+    <p:sldId id="342" r:id="rId4"/>
+    <p:sldId id="335" r:id="rId5"/>
+    <p:sldId id="336" r:id="rId6"/>
+    <p:sldId id="337" r:id="rId7"/>
+    <p:sldId id="338" r:id="rId8"/>
+    <p:sldId id="339" r:id="rId9"/>
+    <p:sldId id="340" r:id="rId10"/>
+    <p:sldId id="341" r:id="rId11"/>
+    <p:sldId id="331" r:id="rId12"/>
   </p:sldIdLst>
   <p:sldSz cx="9144000" cy="6858000" type="screen4x3"/>
   <p:notesSz cx="6858000" cy="9144000"/>
-  <p:embeddedFontLst>
-    <p:embeddedFont>
-      <p:font typeface="Calibri" panose="020F0502020204030204" pitchFamily="34" charset="0"/>
-      <p:regular r:id="rId13"/>
-      <p:bold r:id="rId14"/>
-      <p:italic r:id="rId15"/>
-      <p:boldItalic r:id="rId16"/>
-    </p:embeddedFont>
-    <p:embeddedFont>
-      <p:font typeface="Circo" panose="02000800000000000000" pitchFamily="2" charset="0"/>
-      <p:regular r:id="rId17"/>
-    </p:embeddedFont>
-    <p:embeddedFont>
-      <p:font typeface="Tahoma" panose="020B0604030504040204" pitchFamily="34" charset="0"/>
-      <p:regular r:id="rId18"/>
-      <p:bold r:id="rId19"/>
-    </p:embeddedFont>
-  </p:embeddedFontLst>
   <p:defaultTextStyle>
     <a:defPPr>
       <a:defRPr lang="en-US"/>
@@ -141,6 +124,7 @@
           <p14:sldIdLst>
             <p14:sldId id="256"/>
             <p14:sldId id="333"/>
+            <p14:sldId id="342"/>
             <p14:sldId id="335"/>
             <p14:sldId id="336"/>
             <p14:sldId id="337"/>
@@ -158,7 +142,7 @@
       </p14:sectionLst>
     </p:ext>
     <p:ext uri="{EFAFB233-063F-42B5-8137-9DF3F51BA10A}">
-      <p15:sldGuideLst xmlns:p15="http://schemas.microsoft.com/office/powerpoint/2012/main">
+      <p15:sldGuideLst xmlns:p15="http://schemas.microsoft.com/office/powerpoint/2012/main" xmlns="">
         <p15:guide id="1" orient="horz" pos="2160" userDrawn="1">
           <p15:clr>
             <a:srgbClr val="A4A3A4"/>
@@ -257,7 +241,7 @@
           <a:p>
             <a:fld id="{B8521E8C-A508-41A1-9084-4B57012D21FE}" type="datetimeFigureOut">
               <a:rPr lang="en-US" smtClean="0"/>
-              <a:t>10/18/2017</a:t>
+              <a:t>18/10/17</a:t>
             </a:fld>
             <a:endParaRPr lang="en-US"/>
           </a:p>
@@ -4838,7 +4822,7 @@
   <p:clrMapOvr>
     <a:masterClrMapping/>
   </p:clrMapOvr>
-  <p:transition spd="slow">
+  <p:transition xmlns:p14="http://schemas.microsoft.com/office/powerpoint/2010/main" spd="slow">
     <p:wipe dir="r"/>
   </p:transition>
 </p:sld>
@@ -4863,6 +4847,182 @@
       </p:grpSpPr>
       <p:sp>
         <p:nvSpPr>
+          <p:cNvPr id="2" name="Title 1"/>
+          <p:cNvSpPr>
+            <a:spLocks noGrp="1"/>
+          </p:cNvSpPr>
+          <p:nvPr>
+            <p:ph type="title"/>
+          </p:nvPr>
+        </p:nvSpPr>
+        <p:spPr/>
+        <p:txBody>
+          <a:bodyPr/>
+          <a:lstStyle/>
+          <a:p>
+            <a:r>
+              <a:rPr lang="en-US" dirty="0" smtClean="0"/>
+              <a:t>Conclusion</a:t>
+            </a:r>
+            <a:endParaRPr lang="en-US" dirty="0"/>
+          </a:p>
+        </p:txBody>
+      </p:sp>
+      <p:sp>
+        <p:nvSpPr>
+          <p:cNvPr id="3" name="Content Placeholder 2"/>
+          <p:cNvSpPr>
+            <a:spLocks noGrp="1"/>
+          </p:cNvSpPr>
+          <p:nvPr>
+            <p:ph sz="quarter" idx="13"/>
+          </p:nvPr>
+        </p:nvSpPr>
+        <p:spPr/>
+        <p:txBody>
+          <a:bodyPr/>
+          <a:lstStyle/>
+          <a:p>
+            <a:r>
+              <a:rPr lang="en-US" dirty="0" smtClean="0"/>
+              <a:t>The </a:t>
+            </a:r>
+            <a:r>
+              <a:rPr lang="en-US" dirty="0" err="1" smtClean="0"/>
+              <a:t>Onthology</a:t>
+            </a:r>
+            <a:r>
+              <a:rPr lang="en-US" dirty="0" smtClean="0"/>
+              <a:t> must be improved</a:t>
+            </a:r>
+          </a:p>
+          <a:p>
+            <a:r>
+              <a:rPr lang="en-US" dirty="0" smtClean="0"/>
+              <a:t>Some questions answered</a:t>
+            </a:r>
+            <a:r>
+              <a:rPr lang="mr-IN" dirty="0" smtClean="0"/>
+              <a:t>…</a:t>
+            </a:r>
+          </a:p>
+          <a:p>
+            <a:r>
+              <a:rPr lang="mr-IN" dirty="0" smtClean="0"/>
+              <a:t>Future steps...</a:t>
+            </a:r>
+          </a:p>
+          <a:p>
+            <a:r>
+              <a:rPr lang="mr-IN" dirty="0" smtClean="0"/>
+              <a:t>To a brighter future</a:t>
+            </a:r>
+            <a:endParaRPr lang="en-US" dirty="0"/>
+          </a:p>
+        </p:txBody>
+      </p:sp>
+      <p:sp>
+        <p:nvSpPr>
+          <p:cNvPr id="7" name="Date Placeholder 6"/>
+          <p:cNvSpPr>
+            <a:spLocks noGrp="1"/>
+          </p:cNvSpPr>
+          <p:nvPr>
+            <p:ph type="dt" sz="half" idx="14"/>
+          </p:nvPr>
+        </p:nvSpPr>
+        <p:spPr/>
+        <p:txBody>
+          <a:bodyPr/>
+          <a:lstStyle/>
+          <a:p>
+            <a:r>
+              <a:rPr lang="pt-BR" smtClean="0"/>
+              <a:t>Joshua Kritz</a:t>
+            </a:r>
+            <a:endParaRPr lang="pt-BR"/>
+          </a:p>
+        </p:txBody>
+      </p:sp>
+      <p:sp>
+        <p:nvSpPr>
+          <p:cNvPr id="8" name="Footer Placeholder 7"/>
+          <p:cNvSpPr>
+            <a:spLocks noGrp="1"/>
+          </p:cNvSpPr>
+          <p:nvPr>
+            <p:ph type="ftr" sz="quarter" idx="15"/>
+          </p:nvPr>
+        </p:nvSpPr>
+        <p:spPr/>
+        <p:txBody>
+          <a:bodyPr/>
+          <a:lstStyle/>
+          <a:p>
+            <a:r>
+              <a:rPr lang="pt-BR" smtClean="0"/>
+              <a:t>SBGames 2017</a:t>
+            </a:r>
+            <a:endParaRPr lang="pt-BR"/>
+          </a:p>
+        </p:txBody>
+      </p:sp>
+      <p:sp>
+        <p:nvSpPr>
+          <p:cNvPr id="9" name="Slide Number Placeholder 8"/>
+          <p:cNvSpPr>
+            <a:spLocks noGrp="1"/>
+          </p:cNvSpPr>
+          <p:nvPr>
+            <p:ph type="sldNum" sz="quarter" idx="16"/>
+          </p:nvPr>
+        </p:nvSpPr>
+        <p:spPr/>
+        <p:txBody>
+          <a:bodyPr/>
+          <a:lstStyle/>
+          <a:p>
+            <a:fld id="{5A0DFCC9-F812-4F9D-88E5-09A305815A3B}" type="slidenum">
+              <a:rPr lang="pt-BR" smtClean="0"/>
+              <a:pPr/>
+              <a:t>10</a:t>
+            </a:fld>
+            <a:endParaRPr lang="pt-BR"/>
+          </a:p>
+        </p:txBody>
+      </p:sp>
+    </p:spTree>
+    <p:extLst>
+      <p:ext uri="{BB962C8B-B14F-4D97-AF65-F5344CB8AC3E}">
+        <p14:creationId xmlns:p14="http://schemas.microsoft.com/office/powerpoint/2010/main" val="3169251280"/>
+      </p:ext>
+    </p:extLst>
+  </p:cSld>
+  <p:clrMapOvr>
+    <a:masterClrMapping/>
+  </p:clrMapOvr>
+</p:sld>
+</file>
+
+<file path=ppt/slides/slide11.xml><?xml version="1.0" encoding="utf-8"?>
+<p:sld xmlns:a="http://schemas.openxmlformats.org/drawingml/2006/main" xmlns:r="http://schemas.openxmlformats.org/officeDocument/2006/relationships" xmlns:p="http://schemas.openxmlformats.org/presentationml/2006/main">
+  <p:cSld>
+    <p:spTree>
+      <p:nvGrpSpPr>
+        <p:cNvPr id="1" name=""/>
+        <p:cNvGrpSpPr/>
+        <p:nvPr/>
+      </p:nvGrpSpPr>
+      <p:grpSpPr>
+        <a:xfrm>
+          <a:off x="0" y="0"/>
+          <a:ext cx="0" cy="0"/>
+          <a:chOff x="0" y="0"/>
+          <a:chExt cx="0" cy="0"/>
+        </a:xfrm>
+      </p:grpSpPr>
+      <p:sp>
+        <p:nvSpPr>
           <p:cNvPr id="5" name="Text Placeholder 4"/>
           <p:cNvSpPr>
             <a:spLocks noGrp="1"/>
@@ -4962,11 +5122,7 @@
             </a:br>
             <a:r>
               <a:rPr lang="en-US" dirty="0" smtClean="0"/>
-              <a:t>For </a:t>
-            </a:r>
-            <a:r>
-              <a:rPr lang="en-US" dirty="0" smtClean="0"/>
-              <a:t>papers, games and other work, please consult our website</a:t>
+              <a:t>For papers, games and other work, please consult our website</a:t>
             </a:r>
             <a:endParaRPr lang="en-US" dirty="0"/>
           </a:p>
@@ -5066,7 +5222,7 @@
             <a:fld id="{5A0DFCC9-F812-4F9D-88E5-09A305815A3B}" type="slidenum">
               <a:rPr lang="pt-BR" smtClean="0"/>
               <a:pPr/>
-              <a:t>10</a:t>
+              <a:t>11</a:t>
             </a:fld>
             <a:endParaRPr lang="pt-BR"/>
           </a:p>
@@ -5311,6 +5467,148 @@
           <a:lstStyle/>
           <a:p>
             <a:r>
+              <a:rPr lang="en-US" dirty="0" smtClean="0"/>
+              <a:t>This work</a:t>
+            </a:r>
+            <a:endParaRPr lang="en-US" dirty="0"/>
+          </a:p>
+        </p:txBody>
+      </p:sp>
+      <p:sp>
+        <p:nvSpPr>
+          <p:cNvPr id="3" name="Content Placeholder 2"/>
+          <p:cNvSpPr>
+            <a:spLocks noGrp="1"/>
+          </p:cNvSpPr>
+          <p:nvPr>
+            <p:ph sz="quarter" idx="13"/>
+          </p:nvPr>
+        </p:nvSpPr>
+        <p:spPr/>
+        <p:txBody>
+          <a:bodyPr/>
+          <a:lstStyle/>
+          <a:p>
+            <a:endParaRPr lang="en-US"/>
+          </a:p>
+        </p:txBody>
+      </p:sp>
+      <p:sp>
+        <p:nvSpPr>
+          <p:cNvPr id="4" name="Date Placeholder 3"/>
+          <p:cNvSpPr>
+            <a:spLocks noGrp="1"/>
+          </p:cNvSpPr>
+          <p:nvPr>
+            <p:ph type="dt" sz="half" idx="14"/>
+          </p:nvPr>
+        </p:nvSpPr>
+        <p:spPr/>
+        <p:txBody>
+          <a:bodyPr/>
+          <a:lstStyle/>
+          <a:p>
+            <a:r>
+              <a:rPr lang="pt-BR" smtClean="0"/>
+              <a:t>Joshua Kritz</a:t>
+            </a:r>
+            <a:endParaRPr lang="pt-BR"/>
+          </a:p>
+        </p:txBody>
+      </p:sp>
+      <p:sp>
+        <p:nvSpPr>
+          <p:cNvPr id="5" name="Footer Placeholder 4"/>
+          <p:cNvSpPr>
+            <a:spLocks noGrp="1"/>
+          </p:cNvSpPr>
+          <p:nvPr>
+            <p:ph type="ftr" sz="quarter" idx="15"/>
+          </p:nvPr>
+        </p:nvSpPr>
+        <p:spPr/>
+        <p:txBody>
+          <a:bodyPr/>
+          <a:lstStyle/>
+          <a:p>
+            <a:r>
+              <a:rPr lang="pt-BR" smtClean="0"/>
+              <a:t>SBGames 2017</a:t>
+            </a:r>
+            <a:endParaRPr lang="pt-BR"/>
+          </a:p>
+        </p:txBody>
+      </p:sp>
+      <p:sp>
+        <p:nvSpPr>
+          <p:cNvPr id="6" name="Slide Number Placeholder 5"/>
+          <p:cNvSpPr>
+            <a:spLocks noGrp="1"/>
+          </p:cNvSpPr>
+          <p:nvPr>
+            <p:ph type="sldNum" sz="quarter" idx="16"/>
+          </p:nvPr>
+        </p:nvSpPr>
+        <p:spPr/>
+        <p:txBody>
+          <a:bodyPr/>
+          <a:lstStyle/>
+          <a:p>
+            <a:fld id="{5A0DFCC9-F812-4F9D-88E5-09A305815A3B}" type="slidenum">
+              <a:rPr lang="pt-BR" smtClean="0"/>
+              <a:pPr/>
+              <a:t>3</a:t>
+            </a:fld>
+            <a:endParaRPr lang="pt-BR"/>
+          </a:p>
+        </p:txBody>
+      </p:sp>
+    </p:spTree>
+    <p:extLst>
+      <p:ext uri="{BB962C8B-B14F-4D97-AF65-F5344CB8AC3E}">
+        <p14:creationId xmlns:p14="http://schemas.microsoft.com/office/powerpoint/2010/main" val="1404078630"/>
+      </p:ext>
+    </p:extLst>
+  </p:cSld>
+  <p:clrMapOvr>
+    <a:masterClrMapping/>
+  </p:clrMapOvr>
+</p:sld>
+</file>
+
+<file path=ppt/slides/slide4.xml><?xml version="1.0" encoding="utf-8"?>
+<p:sld xmlns:a="http://schemas.openxmlformats.org/drawingml/2006/main" xmlns:r="http://schemas.openxmlformats.org/officeDocument/2006/relationships" xmlns:p="http://schemas.openxmlformats.org/presentationml/2006/main">
+  <p:cSld>
+    <p:spTree>
+      <p:nvGrpSpPr>
+        <p:cNvPr id="1" name=""/>
+        <p:cNvGrpSpPr/>
+        <p:nvPr/>
+      </p:nvGrpSpPr>
+      <p:grpSpPr>
+        <a:xfrm>
+          <a:off x="0" y="0"/>
+          <a:ext cx="0" cy="0"/>
+          <a:chOff x="0" y="0"/>
+          <a:chExt cx="0" cy="0"/>
+        </a:xfrm>
+      </p:grpSpPr>
+      <p:sp>
+        <p:nvSpPr>
+          <p:cNvPr id="2" name="Title 1"/>
+          <p:cNvSpPr>
+            <a:spLocks noGrp="1"/>
+          </p:cNvSpPr>
+          <p:nvPr>
+            <p:ph type="title"/>
+          </p:nvPr>
+        </p:nvSpPr>
+        <p:spPr/>
+        <p:txBody>
+          <a:bodyPr/>
+          <a:lstStyle/>
+          <a:p>
+            <a:r>
               <a:rPr lang="pt-BR" dirty="0" err="1" smtClean="0"/>
               <a:t>BoardGameGeek</a:t>
             </a:r>
@@ -5536,7 +5834,7 @@
             <a:fld id="{5A0DFCC9-F812-4F9D-88E5-09A305815A3B}" type="slidenum">
               <a:rPr lang="pt-BR" smtClean="0"/>
               <a:pPr/>
-              <a:t>3</a:t>
+              <a:t>4</a:t>
             </a:fld>
             <a:endParaRPr lang="pt-BR"/>
           </a:p>
@@ -5555,7 +5853,7 @@
 </p:sld>
 </file>
 
-<file path=ppt/slides/slide4.xml><?xml version="1.0" encoding="utf-8"?>
+<file path=ppt/slides/slide5.xml><?xml version="1.0" encoding="utf-8"?>
 <p:sld xmlns:a="http://schemas.openxmlformats.org/drawingml/2006/main" xmlns:r="http://schemas.openxmlformats.org/officeDocument/2006/relationships" xmlns:p="http://schemas.openxmlformats.org/presentationml/2006/main">
   <p:cSld>
     <p:spTree>
@@ -5730,7 +6028,7 @@
             <a:fld id="{5A0DFCC9-F812-4F9D-88E5-09A305815A3B}" type="slidenum">
               <a:rPr lang="pt-BR" smtClean="0"/>
               <a:pPr/>
-              <a:t>4</a:t>
+              <a:t>5</a:t>
             </a:fld>
             <a:endParaRPr lang="pt-BR"/>
           </a:p>
@@ -5740,166 +6038,6 @@
     <p:extLst>
       <p:ext uri="{BB962C8B-B14F-4D97-AF65-F5344CB8AC3E}">
         <p14:creationId xmlns:p14="http://schemas.microsoft.com/office/powerpoint/2010/main" val="4053352771"/>
-      </p:ext>
-    </p:extLst>
-  </p:cSld>
-  <p:clrMapOvr>
-    <a:masterClrMapping/>
-  </p:clrMapOvr>
-</p:sld>
-</file>
-
-<file path=ppt/slides/slide5.xml><?xml version="1.0" encoding="utf-8"?>
-<p:sld xmlns:a="http://schemas.openxmlformats.org/drawingml/2006/main" xmlns:r="http://schemas.openxmlformats.org/officeDocument/2006/relationships" xmlns:p="http://schemas.openxmlformats.org/presentationml/2006/main">
-  <p:cSld>
-    <p:spTree>
-      <p:nvGrpSpPr>
-        <p:cNvPr id="1" name=""/>
-        <p:cNvGrpSpPr/>
-        <p:nvPr/>
-      </p:nvGrpSpPr>
-      <p:grpSpPr>
-        <a:xfrm>
-          <a:off x="0" y="0"/>
-          <a:ext cx="0" cy="0"/>
-          <a:chOff x="0" y="0"/>
-          <a:chExt cx="0" cy="0"/>
-        </a:xfrm>
-      </p:grpSpPr>
-      <p:sp>
-        <p:nvSpPr>
-          <p:cNvPr id="2" name="Title 1"/>
-          <p:cNvSpPr>
-            <a:spLocks noGrp="1"/>
-          </p:cNvSpPr>
-          <p:nvPr>
-            <p:ph type="title"/>
-          </p:nvPr>
-        </p:nvSpPr>
-        <p:spPr/>
-        <p:txBody>
-          <a:bodyPr/>
-          <a:lstStyle/>
-          <a:p>
-            <a:r>
-              <a:rPr lang="en-US" dirty="0" smtClean="0"/>
-              <a:t>Methodology</a:t>
-            </a:r>
-            <a:endParaRPr lang="en-US" dirty="0"/>
-          </a:p>
-        </p:txBody>
-      </p:sp>
-      <p:sp>
-        <p:nvSpPr>
-          <p:cNvPr id="3" name="Content Placeholder 2"/>
-          <p:cNvSpPr>
-            <a:spLocks noGrp="1"/>
-          </p:cNvSpPr>
-          <p:nvPr>
-            <p:ph sz="quarter" idx="13"/>
-          </p:nvPr>
-        </p:nvSpPr>
-        <p:spPr/>
-        <p:txBody>
-          <a:bodyPr/>
-          <a:lstStyle/>
-          <a:p>
-            <a:r>
-              <a:rPr lang="en-US" dirty="0" smtClean="0"/>
-              <a:t>Based on MENELAS</a:t>
-            </a:r>
-          </a:p>
-          <a:p>
-            <a:r>
-              <a:rPr lang="en-US" dirty="0" smtClean="0"/>
-              <a:t>Built upon common-sense knowledge</a:t>
-            </a:r>
-          </a:p>
-          <a:p>
-            <a:r>
-              <a:rPr lang="en-US" dirty="0" smtClean="0"/>
-              <a:t>Simplicity and adequacy to the domain</a:t>
-            </a:r>
-          </a:p>
-          <a:p>
-            <a:endParaRPr lang="en-US" dirty="0"/>
-          </a:p>
-        </p:txBody>
-      </p:sp>
-      <p:sp>
-        <p:nvSpPr>
-          <p:cNvPr id="7" name="Date Placeholder 6"/>
-          <p:cNvSpPr>
-            <a:spLocks noGrp="1"/>
-          </p:cNvSpPr>
-          <p:nvPr>
-            <p:ph type="dt" sz="half" idx="14"/>
-          </p:nvPr>
-        </p:nvSpPr>
-        <p:spPr/>
-        <p:txBody>
-          <a:bodyPr/>
-          <a:lstStyle/>
-          <a:p>
-            <a:r>
-              <a:rPr lang="pt-BR" smtClean="0"/>
-              <a:t>Joshua Kritz</a:t>
-            </a:r>
-            <a:endParaRPr lang="pt-BR"/>
-          </a:p>
-        </p:txBody>
-      </p:sp>
-      <p:sp>
-        <p:nvSpPr>
-          <p:cNvPr id="8" name="Footer Placeholder 7"/>
-          <p:cNvSpPr>
-            <a:spLocks noGrp="1"/>
-          </p:cNvSpPr>
-          <p:nvPr>
-            <p:ph type="ftr" sz="quarter" idx="15"/>
-          </p:nvPr>
-        </p:nvSpPr>
-        <p:spPr/>
-        <p:txBody>
-          <a:bodyPr/>
-          <a:lstStyle/>
-          <a:p>
-            <a:r>
-              <a:rPr lang="pt-BR" smtClean="0"/>
-              <a:t>SBGames 2017</a:t>
-            </a:r>
-            <a:endParaRPr lang="pt-BR"/>
-          </a:p>
-        </p:txBody>
-      </p:sp>
-      <p:sp>
-        <p:nvSpPr>
-          <p:cNvPr id="9" name="Slide Number Placeholder 8"/>
-          <p:cNvSpPr>
-            <a:spLocks noGrp="1"/>
-          </p:cNvSpPr>
-          <p:nvPr>
-            <p:ph type="sldNum" sz="quarter" idx="16"/>
-          </p:nvPr>
-        </p:nvSpPr>
-        <p:spPr/>
-        <p:txBody>
-          <a:bodyPr/>
-          <a:lstStyle/>
-          <a:p>
-            <a:fld id="{5A0DFCC9-F812-4F9D-88E5-09A305815A3B}" type="slidenum">
-              <a:rPr lang="pt-BR" smtClean="0"/>
-              <a:pPr/>
-              <a:t>5</a:t>
-            </a:fld>
-            <a:endParaRPr lang="pt-BR"/>
-          </a:p>
-        </p:txBody>
-      </p:sp>
-    </p:spTree>
-    <p:extLst>
-      <p:ext uri="{BB962C8B-B14F-4D97-AF65-F5344CB8AC3E}">
-        <p14:creationId xmlns:p14="http://schemas.microsoft.com/office/powerpoint/2010/main" val="235667430"/>
       </p:ext>
     </p:extLst>
   </p:cSld>
@@ -5943,7 +6081,7 @@
           <a:p>
             <a:r>
               <a:rPr lang="en-US" dirty="0" smtClean="0"/>
-              <a:t>Scope</a:t>
+              <a:t>Methodology</a:t>
             </a:r>
             <a:endParaRPr lang="en-US" dirty="0"/>
           </a:p>
@@ -5961,33 +6099,27 @@
         </p:nvSpPr>
         <p:spPr/>
         <p:txBody>
-          <a:bodyPr>
-            <a:normAutofit fontScale="92500" lnSpcReduction="10000"/>
-          </a:bodyPr>
+          <a:bodyPr/>
           <a:lstStyle/>
           <a:p>
             <a:r>
               <a:rPr lang="en-US" dirty="0" smtClean="0"/>
-              <a:t>Only concepts identifiable in the BGG mechanics list should appear as leaves of the ontology</a:t>
+              <a:t>Based on MENELAS</a:t>
             </a:r>
           </a:p>
           <a:p>
             <a:r>
               <a:rPr lang="en-US" dirty="0" smtClean="0"/>
-              <a:t>For each of the 51 mechanics there should be a decision if it is a mechanic or not accordingly to MDA</a:t>
+              <a:t>Built upon common-sense knowledge</a:t>
             </a:r>
           </a:p>
           <a:p>
             <a:r>
               <a:rPr lang="en-US" dirty="0" smtClean="0"/>
-              <a:t>Higher level concepts should be based on the MDA Framework, references or on the BGG mechanics list</a:t>
-            </a:r>
-          </a:p>
-          <a:p>
-            <a:r>
-              <a:rPr lang="en-US" dirty="0" smtClean="0"/>
-              <a:t>Compound mechanics should be broken in their constituents</a:t>
-            </a:r>
+              <a:t>Simplicity and adequacy to the domain</a:t>
+            </a:r>
+          </a:p>
+          <a:p>
             <a:endParaRPr lang="en-US" dirty="0"/>
           </a:p>
         </p:txBody>
@@ -6057,6 +6189,172 @@
               <a:rPr lang="pt-BR" smtClean="0"/>
               <a:pPr/>
               <a:t>6</a:t>
+            </a:fld>
+            <a:endParaRPr lang="pt-BR"/>
+          </a:p>
+        </p:txBody>
+      </p:sp>
+    </p:spTree>
+    <p:extLst>
+      <p:ext uri="{BB962C8B-B14F-4D97-AF65-F5344CB8AC3E}">
+        <p14:creationId xmlns:p14="http://schemas.microsoft.com/office/powerpoint/2010/main" val="235667430"/>
+      </p:ext>
+    </p:extLst>
+  </p:cSld>
+  <p:clrMapOvr>
+    <a:masterClrMapping/>
+  </p:clrMapOvr>
+</p:sld>
+</file>
+
+<file path=ppt/slides/slide7.xml><?xml version="1.0" encoding="utf-8"?>
+<p:sld xmlns:a="http://schemas.openxmlformats.org/drawingml/2006/main" xmlns:r="http://schemas.openxmlformats.org/officeDocument/2006/relationships" xmlns:p="http://schemas.openxmlformats.org/presentationml/2006/main">
+  <p:cSld>
+    <p:spTree>
+      <p:nvGrpSpPr>
+        <p:cNvPr id="1" name=""/>
+        <p:cNvGrpSpPr/>
+        <p:nvPr/>
+      </p:nvGrpSpPr>
+      <p:grpSpPr>
+        <a:xfrm>
+          <a:off x="0" y="0"/>
+          <a:ext cx="0" cy="0"/>
+          <a:chOff x="0" y="0"/>
+          <a:chExt cx="0" cy="0"/>
+        </a:xfrm>
+      </p:grpSpPr>
+      <p:sp>
+        <p:nvSpPr>
+          <p:cNvPr id="2" name="Title 1"/>
+          <p:cNvSpPr>
+            <a:spLocks noGrp="1"/>
+          </p:cNvSpPr>
+          <p:nvPr>
+            <p:ph type="title"/>
+          </p:nvPr>
+        </p:nvSpPr>
+        <p:spPr/>
+        <p:txBody>
+          <a:bodyPr/>
+          <a:lstStyle/>
+          <a:p>
+            <a:r>
+              <a:rPr lang="en-US" dirty="0" smtClean="0"/>
+              <a:t>Scope</a:t>
+            </a:r>
+            <a:endParaRPr lang="en-US" dirty="0"/>
+          </a:p>
+        </p:txBody>
+      </p:sp>
+      <p:sp>
+        <p:nvSpPr>
+          <p:cNvPr id="3" name="Content Placeholder 2"/>
+          <p:cNvSpPr>
+            <a:spLocks noGrp="1"/>
+          </p:cNvSpPr>
+          <p:nvPr>
+            <p:ph sz="quarter" idx="13"/>
+          </p:nvPr>
+        </p:nvSpPr>
+        <p:spPr/>
+        <p:txBody>
+          <a:bodyPr>
+            <a:normAutofit fontScale="92500" lnSpcReduction="10000"/>
+          </a:bodyPr>
+          <a:lstStyle/>
+          <a:p>
+            <a:r>
+              <a:rPr lang="en-US" dirty="0" smtClean="0"/>
+              <a:t>Only concepts identifiable in the BGG mechanics list should appear as leaves of the ontology</a:t>
+            </a:r>
+          </a:p>
+          <a:p>
+            <a:r>
+              <a:rPr lang="en-US" dirty="0" smtClean="0"/>
+              <a:t>For each of the 51 mechanics there should be a decision if it is a mechanic or not accordingly to MDA</a:t>
+            </a:r>
+          </a:p>
+          <a:p>
+            <a:r>
+              <a:rPr lang="en-US" dirty="0" smtClean="0"/>
+              <a:t>Higher level concepts should be based on the MDA Framework, references or on the BGG mechanics list</a:t>
+            </a:r>
+          </a:p>
+          <a:p>
+            <a:r>
+              <a:rPr lang="en-US" dirty="0" smtClean="0"/>
+              <a:t>Compound mechanics should be broken in their constituents</a:t>
+            </a:r>
+            <a:endParaRPr lang="en-US" dirty="0"/>
+          </a:p>
+        </p:txBody>
+      </p:sp>
+      <p:sp>
+        <p:nvSpPr>
+          <p:cNvPr id="7" name="Date Placeholder 6"/>
+          <p:cNvSpPr>
+            <a:spLocks noGrp="1"/>
+          </p:cNvSpPr>
+          <p:nvPr>
+            <p:ph type="dt" sz="half" idx="14"/>
+          </p:nvPr>
+        </p:nvSpPr>
+        <p:spPr/>
+        <p:txBody>
+          <a:bodyPr/>
+          <a:lstStyle/>
+          <a:p>
+            <a:r>
+              <a:rPr lang="pt-BR" smtClean="0"/>
+              <a:t>Joshua Kritz</a:t>
+            </a:r>
+            <a:endParaRPr lang="pt-BR"/>
+          </a:p>
+        </p:txBody>
+      </p:sp>
+      <p:sp>
+        <p:nvSpPr>
+          <p:cNvPr id="8" name="Footer Placeholder 7"/>
+          <p:cNvSpPr>
+            <a:spLocks noGrp="1"/>
+          </p:cNvSpPr>
+          <p:nvPr>
+            <p:ph type="ftr" sz="quarter" idx="15"/>
+          </p:nvPr>
+        </p:nvSpPr>
+        <p:spPr/>
+        <p:txBody>
+          <a:bodyPr/>
+          <a:lstStyle/>
+          <a:p>
+            <a:r>
+              <a:rPr lang="pt-BR" smtClean="0"/>
+              <a:t>SBGames 2017</a:t>
+            </a:r>
+            <a:endParaRPr lang="pt-BR"/>
+          </a:p>
+        </p:txBody>
+      </p:sp>
+      <p:sp>
+        <p:nvSpPr>
+          <p:cNvPr id="9" name="Slide Number Placeholder 8"/>
+          <p:cNvSpPr>
+            <a:spLocks noGrp="1"/>
+          </p:cNvSpPr>
+          <p:nvPr>
+            <p:ph type="sldNum" sz="quarter" idx="16"/>
+          </p:nvPr>
+        </p:nvSpPr>
+        <p:spPr/>
+        <p:txBody>
+          <a:bodyPr/>
+          <a:lstStyle/>
+          <a:p>
+            <a:fld id="{5A0DFCC9-F812-4F9D-88E5-09A305815A3B}" type="slidenum">
+              <a:rPr lang="pt-BR" smtClean="0"/>
+              <a:pPr/>
+              <a:t>7</a:t>
             </a:fld>
             <a:endParaRPr lang="pt-BR"/>
           </a:p>
@@ -6075,7 +6373,7 @@
 </p:sld>
 </file>
 
-<file path=ppt/slides/slide7.xml><?xml version="1.0" encoding="utf-8"?>
+<file path=ppt/slides/slide8.xml><?xml version="1.0" encoding="utf-8"?>
 <p:sld xmlns:a="http://schemas.openxmlformats.org/drawingml/2006/main" xmlns:r="http://schemas.openxmlformats.org/officeDocument/2006/relationships" xmlns:p="http://schemas.openxmlformats.org/presentationml/2006/main">
   <p:cSld>
     <p:spTree>
@@ -6223,7 +6521,7 @@
             <a:fld id="{5A0DFCC9-F812-4F9D-88E5-09A305815A3B}" type="slidenum">
               <a:rPr lang="pt-BR" smtClean="0"/>
               <a:pPr/>
-              <a:t>7</a:t>
+              <a:t>8</a:t>
             </a:fld>
             <a:endParaRPr lang="pt-BR"/>
           </a:p>
@@ -6233,199 +6531,6 @@
     <p:extLst>
       <p:ext uri="{BB962C8B-B14F-4D97-AF65-F5344CB8AC3E}">
         <p14:creationId xmlns:p14="http://schemas.microsoft.com/office/powerpoint/2010/main" val="4100569470"/>
-      </p:ext>
-    </p:extLst>
-  </p:cSld>
-  <p:clrMapOvr>
-    <a:masterClrMapping/>
-  </p:clrMapOvr>
-</p:sld>
-</file>
-
-<file path=ppt/slides/slide8.xml><?xml version="1.0" encoding="utf-8"?>
-<p:sld xmlns:a="http://schemas.openxmlformats.org/drawingml/2006/main" xmlns:r="http://schemas.openxmlformats.org/officeDocument/2006/relationships" xmlns:p="http://schemas.openxmlformats.org/presentationml/2006/main">
-  <p:cSld>
-    <p:spTree>
-      <p:nvGrpSpPr>
-        <p:cNvPr id="1" name=""/>
-        <p:cNvGrpSpPr/>
-        <p:nvPr/>
-      </p:nvGrpSpPr>
-      <p:grpSpPr>
-        <a:xfrm>
-          <a:off x="0" y="0"/>
-          <a:ext cx="0" cy="0"/>
-          <a:chOff x="0" y="0"/>
-          <a:chExt cx="0" cy="0"/>
-        </a:xfrm>
-      </p:grpSpPr>
-      <p:sp>
-        <p:nvSpPr>
-          <p:cNvPr id="2" name="Title 1"/>
-          <p:cNvSpPr>
-            <a:spLocks noGrp="1"/>
-          </p:cNvSpPr>
-          <p:nvPr>
-            <p:ph type="title"/>
-          </p:nvPr>
-        </p:nvSpPr>
-        <p:spPr/>
-        <p:txBody>
-          <a:bodyPr/>
-          <a:lstStyle/>
-          <a:p>
-            <a:r>
-              <a:rPr lang="en-US" dirty="0" smtClean="0"/>
-              <a:t>The Ontology</a:t>
-            </a:r>
-            <a:endParaRPr lang="en-US" dirty="0"/>
-          </a:p>
-        </p:txBody>
-      </p:sp>
-      <p:sp>
-        <p:nvSpPr>
-          <p:cNvPr id="3" name="Content Placeholder 2"/>
-          <p:cNvSpPr>
-            <a:spLocks noGrp="1"/>
-          </p:cNvSpPr>
-          <p:nvPr>
-            <p:ph sz="quarter" idx="13"/>
-          </p:nvPr>
-        </p:nvSpPr>
-        <p:spPr/>
-        <p:txBody>
-          <a:bodyPr/>
-          <a:lstStyle/>
-          <a:p>
-            <a:r>
-              <a:rPr lang="en-US" dirty="0" smtClean="0"/>
-              <a:t>Part-of Relations</a:t>
-            </a:r>
-          </a:p>
-          <a:p>
-            <a:r>
-              <a:rPr lang="en-US" dirty="0" smtClean="0"/>
-              <a:t>BGG mechanics left out:</a:t>
-            </a:r>
-          </a:p>
-          <a:p>
-            <a:pPr lvl="1"/>
-            <a:r>
-              <a:rPr lang="en-US" dirty="0" smtClean="0"/>
-              <a:t>Hex &amp; Counter</a:t>
-            </a:r>
-          </a:p>
-          <a:p>
-            <a:pPr lvl="1"/>
-            <a:r>
-              <a:rPr lang="en-US" dirty="0" smtClean="0"/>
-              <a:t>Deck Building</a:t>
-            </a:r>
-          </a:p>
-          <a:p>
-            <a:pPr lvl="1"/>
-            <a:r>
-              <a:rPr lang="en-US" dirty="0" smtClean="0"/>
-              <a:t>Crayon Rail System</a:t>
-            </a:r>
-          </a:p>
-          <a:p>
-            <a:r>
-              <a:rPr lang="en-US" dirty="0" smtClean="0"/>
-              <a:t>Not Mechanics:</a:t>
-            </a:r>
-          </a:p>
-          <a:p>
-            <a:pPr lvl="1"/>
-            <a:r>
-              <a:rPr lang="en-US" dirty="0" smtClean="0"/>
-              <a:t>Hand Management</a:t>
-            </a:r>
-          </a:p>
-          <a:p>
-            <a:pPr lvl="1"/>
-            <a:r>
-              <a:rPr lang="en-US" dirty="0" smtClean="0"/>
-              <a:t>Simulation</a:t>
-            </a:r>
-            <a:endParaRPr lang="en-US" dirty="0"/>
-          </a:p>
-        </p:txBody>
-      </p:sp>
-      <p:sp>
-        <p:nvSpPr>
-          <p:cNvPr id="7" name="Date Placeholder 6"/>
-          <p:cNvSpPr>
-            <a:spLocks noGrp="1"/>
-          </p:cNvSpPr>
-          <p:nvPr>
-            <p:ph type="dt" sz="half" idx="14"/>
-          </p:nvPr>
-        </p:nvSpPr>
-        <p:spPr/>
-        <p:txBody>
-          <a:bodyPr/>
-          <a:lstStyle/>
-          <a:p>
-            <a:r>
-              <a:rPr lang="pt-BR" smtClean="0"/>
-              <a:t>Joshua Kritz</a:t>
-            </a:r>
-            <a:endParaRPr lang="pt-BR"/>
-          </a:p>
-        </p:txBody>
-      </p:sp>
-      <p:sp>
-        <p:nvSpPr>
-          <p:cNvPr id="8" name="Footer Placeholder 7"/>
-          <p:cNvSpPr>
-            <a:spLocks noGrp="1"/>
-          </p:cNvSpPr>
-          <p:nvPr>
-            <p:ph type="ftr" sz="quarter" idx="15"/>
-          </p:nvPr>
-        </p:nvSpPr>
-        <p:spPr/>
-        <p:txBody>
-          <a:bodyPr/>
-          <a:lstStyle/>
-          <a:p>
-            <a:r>
-              <a:rPr lang="pt-BR" smtClean="0"/>
-              <a:t>SBGames 2017</a:t>
-            </a:r>
-            <a:endParaRPr lang="pt-BR"/>
-          </a:p>
-        </p:txBody>
-      </p:sp>
-      <p:sp>
-        <p:nvSpPr>
-          <p:cNvPr id="9" name="Slide Number Placeholder 8"/>
-          <p:cNvSpPr>
-            <a:spLocks noGrp="1"/>
-          </p:cNvSpPr>
-          <p:nvPr>
-            <p:ph type="sldNum" sz="quarter" idx="16"/>
-          </p:nvPr>
-        </p:nvSpPr>
-        <p:spPr/>
-        <p:txBody>
-          <a:bodyPr/>
-          <a:lstStyle/>
-          <a:p>
-            <a:fld id="{5A0DFCC9-F812-4F9D-88E5-09A305815A3B}" type="slidenum">
-              <a:rPr lang="pt-BR" smtClean="0"/>
-              <a:pPr/>
-              <a:t>8</a:t>
-            </a:fld>
-            <a:endParaRPr lang="pt-BR"/>
-          </a:p>
-        </p:txBody>
-      </p:sp>
-    </p:spTree>
-    <p:extLst>
-      <p:ext uri="{BB962C8B-B14F-4D97-AF65-F5344CB8AC3E}">
-        <p14:creationId xmlns:p14="http://schemas.microsoft.com/office/powerpoint/2010/main" val="537783489"/>
       </p:ext>
     </p:extLst>
   </p:cSld>
@@ -6469,7 +6574,7 @@
           <a:p>
             <a:r>
               <a:rPr lang="en-US" dirty="0" smtClean="0"/>
-              <a:t>Conclusion</a:t>
+              <a:t>The Ontology</a:t>
             </a:r>
             <a:endParaRPr lang="en-US" dirty="0"/>
           </a:p>
@@ -6492,37 +6597,54 @@
           <a:p>
             <a:r>
               <a:rPr lang="en-US" dirty="0" smtClean="0"/>
-              <a:t>The </a:t>
-            </a:r>
-            <a:r>
-              <a:rPr lang="en-US" dirty="0" err="1" smtClean="0"/>
-              <a:t>Onthology</a:t>
-            </a:r>
+              <a:t>Part-of Relations</a:t>
+            </a:r>
+          </a:p>
+          <a:p>
             <a:r>
               <a:rPr lang="en-US" dirty="0" smtClean="0"/>
-              <a:t> must be improved</a:t>
-            </a:r>
-          </a:p>
-          <a:p>
+              <a:t>BGG mechanics left out:</a:t>
+            </a:r>
+          </a:p>
+          <a:p>
+            <a:pPr lvl="1"/>
             <a:r>
               <a:rPr lang="en-US" dirty="0" smtClean="0"/>
-              <a:t>Some questions answered</a:t>
-            </a:r>
-            <a:r>
-              <a:rPr lang="mr-IN" dirty="0" smtClean="0"/>
-              <a:t>…</a:t>
-            </a:r>
-          </a:p>
-          <a:p>
-            <a:r>
-              <a:rPr lang="mr-IN" dirty="0" smtClean="0"/>
-              <a:t>Future steps...</a:t>
-            </a:r>
-          </a:p>
-          <a:p>
-            <a:r>
-              <a:rPr lang="mr-IN" dirty="0" smtClean="0"/>
-              <a:t>To a brighter future</a:t>
+              <a:t>Hex &amp; Counter</a:t>
+            </a:r>
+          </a:p>
+          <a:p>
+            <a:pPr lvl="1"/>
+            <a:r>
+              <a:rPr lang="en-US" dirty="0" smtClean="0"/>
+              <a:t>Deck Building</a:t>
+            </a:r>
+          </a:p>
+          <a:p>
+            <a:pPr lvl="1"/>
+            <a:r>
+              <a:rPr lang="en-US" dirty="0" smtClean="0"/>
+              <a:t>Crayon Rail System</a:t>
+            </a:r>
+          </a:p>
+          <a:p>
+            <a:r>
+              <a:rPr lang="en-US" dirty="0" smtClean="0"/>
+              <a:t>Not Mechanics:</a:t>
+            </a:r>
+          </a:p>
+          <a:p>
+            <a:pPr lvl="1"/>
+            <a:r>
+              <a:rPr lang="en-US" dirty="0" smtClean="0"/>
+              <a:t>Hand Management</a:t>
+            </a:r>
+          </a:p>
+          <a:p>
+            <a:pPr lvl="1"/>
+            <a:r>
+              <a:rPr lang="en-US" dirty="0" smtClean="0"/>
+              <a:t>Simulation</a:t>
             </a:r>
             <a:endParaRPr lang="en-US" dirty="0"/>
           </a:p>
@@ -6601,7 +6723,7 @@
     </p:spTree>
     <p:extLst>
       <p:ext uri="{BB962C8B-B14F-4D97-AF65-F5344CB8AC3E}">
-        <p14:creationId xmlns:p14="http://schemas.microsoft.com/office/powerpoint/2010/main" val="3169251280"/>
+        <p14:creationId xmlns:p14="http://schemas.microsoft.com/office/powerpoint/2010/main" val="537783489"/>
       </p:ext>
     </p:extLst>
   </p:cSld>
@@ -6910,7 +7032,7 @@
   <a:extraClrSchemeLst/>
   <a:extLst>
     <a:ext uri="{05A4C25C-085E-4340-85A3-A5531E510DB2}">
-      <thm15:themeFamily xmlns:thm15="http://schemas.microsoft.com/office/thememl/2012/main" name="Template Ludes.potx" id="{46A93FAF-1DBD-4E18-9B65-252654BA87DC}" vid="{3366FF25-CE61-4409-B912-537D68118A6E}"/>
+      <thm15:themeFamily xmlns:thm15="http://schemas.microsoft.com/office/thememl/2012/main" xmlns="" name="Template Ludes.potx" id="{46A93FAF-1DBD-4E18-9B65-252654BA87DC}" vid="{3366FF25-CE61-4409-B912-537D68118A6E}"/>
     </a:ext>
   </a:extLst>
 </a:theme>
@@ -7171,7 +7293,7 @@
   <a:extraClrSchemeLst/>
   <a:extLst>
     <a:ext uri="{05A4C25C-085E-4340-85A3-A5531E510DB2}">
-      <thm15:themeFamily xmlns:thm15="http://schemas.microsoft.com/office/thememl/2012/main" name="Office Theme" id="{62F939B6-93AF-4DB8-9C6B-D6C7DFDC589F}" vid="{4A3C46E8-61CC-4603-A589-7422A47A8E4A}"/>
+      <thm15:themeFamily xmlns:thm15="http://schemas.microsoft.com/office/thememl/2012/main" xmlns="" name="Office Theme" id="{62F939B6-93AF-4DB8-9C6B-D6C7DFDC589F}" vid="{4A3C46E8-61CC-4603-A589-7422A47A8E4A}"/>
     </a:ext>
   </a:extLst>
 </a:theme>

</xml_diff>

<commit_message>
Escrever o slide de introdução
</commit_message>
<xml_diff>
--- a/Artigos Apresentados/SBGames2017_Onthology.pptx
+++ b/Artigos Apresentados/SBGames2017_Onthology.pptx
@@ -142,7 +142,7 @@
       </p14:sectionLst>
     </p:ext>
     <p:ext uri="{EFAFB233-063F-42B5-8137-9DF3F51BA10A}">
-      <p15:sldGuideLst xmlns:p15="http://schemas.microsoft.com/office/powerpoint/2012/main" xmlns="">
+      <p15:sldGuideLst xmlns="" xmlns:p15="http://schemas.microsoft.com/office/powerpoint/2012/main">
         <p15:guide id="1" orient="horz" pos="2160" userDrawn="1">
           <p15:clr>
             <a:srgbClr val="A4A3A4"/>
@@ -241,7 +241,7 @@
           <a:p>
             <a:fld id="{B8521E8C-A508-41A1-9084-4B57012D21FE}" type="datetimeFigureOut">
               <a:rPr lang="en-US" smtClean="0"/>
-              <a:t>18/10/17</a:t>
+              <a:t>24/10/17</a:t>
             </a:fld>
             <a:endParaRPr lang="en-US"/>
           </a:p>
@@ -5489,7 +5489,39 @@
           <a:bodyPr/>
           <a:lstStyle/>
           <a:p>
-            <a:endParaRPr lang="en-US"/>
+            <a:r>
+              <a:rPr lang="en-US" dirty="0" smtClean="0"/>
+              <a:t>Built a domain sub-</a:t>
+            </a:r>
+            <a:r>
+              <a:rPr lang="en-US" dirty="0" err="1" smtClean="0"/>
+              <a:t>onthology</a:t>
+            </a:r>
+            <a:r>
+              <a:rPr lang="en-US" dirty="0" smtClean="0"/>
+              <a:t> from BGG database</a:t>
+            </a:r>
+          </a:p>
+          <a:p>
+            <a:r>
+              <a:rPr lang="en-US" dirty="0" smtClean="0"/>
+              <a:t>The </a:t>
+            </a:r>
+            <a:r>
+              <a:rPr lang="en-US" dirty="0" err="1" smtClean="0"/>
+              <a:t>onthology</a:t>
+            </a:r>
+            <a:r>
+              <a:rPr lang="en-US" dirty="0" smtClean="0"/>
+              <a:t> is not exhaustive</a:t>
+            </a:r>
+          </a:p>
+          <a:p>
+            <a:r>
+              <a:rPr lang="en-US" dirty="0" smtClean="0"/>
+              <a:t>Creating a tool for designers and scholars</a:t>
+            </a:r>
+            <a:endParaRPr lang="en-US" dirty="0"/>
           </a:p>
         </p:txBody>
       </p:sp>
@@ -7032,7 +7064,7 @@
   <a:extraClrSchemeLst/>
   <a:extLst>
     <a:ext uri="{05A4C25C-085E-4340-85A3-A5531E510DB2}">
-      <thm15:themeFamily xmlns:thm15="http://schemas.microsoft.com/office/thememl/2012/main" xmlns="" name="Template Ludes.potx" id="{46A93FAF-1DBD-4E18-9B65-252654BA87DC}" vid="{3366FF25-CE61-4409-B912-537D68118A6E}"/>
+      <thm15:themeFamily xmlns="" xmlns:thm15="http://schemas.microsoft.com/office/thememl/2012/main" name="Template Ludes.potx" id="{46A93FAF-1DBD-4E18-9B65-252654BA87DC}" vid="{3366FF25-CE61-4409-B912-537D68118A6E}"/>
     </a:ext>
   </a:extLst>
 </a:theme>
@@ -7293,7 +7325,7 @@
   <a:extraClrSchemeLst/>
   <a:extLst>
     <a:ext uri="{05A4C25C-085E-4340-85A3-A5531E510DB2}">
-      <thm15:themeFamily xmlns:thm15="http://schemas.microsoft.com/office/thememl/2012/main" xmlns="" name="Office Theme" id="{62F939B6-93AF-4DB8-9C6B-D6C7DFDC589F}" vid="{4A3C46E8-61CC-4603-A589-7422A47A8E4A}"/>
+      <thm15:themeFamily xmlns="" xmlns:thm15="http://schemas.microsoft.com/office/thememl/2012/main" name="Office Theme" id="{62F939B6-93AF-4DB8-9C6B-D6C7DFDC589F}" vid="{4A3C46E8-61CC-4603-A589-7422A47A8E4A}"/>
     </a:ext>
   </a:extLst>
 </a:theme>

</xml_diff>

<commit_message>
Adição dos componentes das mecanicas compostas!
</commit_message>
<xml_diff>
--- a/Artigos Apresentados/SBGames2017_Onthology.pptx
+++ b/Artigos Apresentados/SBGames2017_Onthology.pptx
@@ -142,7 +142,7 @@
       </p14:sectionLst>
     </p:ext>
     <p:ext uri="{EFAFB233-063F-42B5-8137-9DF3F51BA10A}">
-      <p15:sldGuideLst xmlns="" xmlns:p15="http://schemas.microsoft.com/office/powerpoint/2012/main">
+      <p15:sldGuideLst xmlns:p15="http://schemas.microsoft.com/office/powerpoint/2012/main" xmlns="">
         <p15:guide id="1" orient="horz" pos="2160" userDrawn="1">
           <p15:clr>
             <a:srgbClr val="A4A3A4"/>
@@ -241,7 +241,7 @@
           <a:p>
             <a:fld id="{B8521E8C-A508-41A1-9084-4B57012D21FE}" type="datetimeFigureOut">
               <a:rPr lang="en-US" smtClean="0"/>
-              <a:t>24/10/17</a:t>
+              <a:t>25/10/17</a:t>
             </a:fld>
             <a:endParaRPr lang="en-US"/>
           </a:p>
@@ -6642,22 +6642,37 @@
             <a:pPr lvl="1"/>
             <a:r>
               <a:rPr lang="en-US" dirty="0" smtClean="0"/>
-              <a:t>Hex &amp; Counter</a:t>
-            </a:r>
+              <a:t>Hex &amp; </a:t>
+            </a:r>
+            <a:r>
+              <a:rPr lang="en-US" dirty="0" smtClean="0"/>
+              <a:t>Counter (Grid Movement &amp; Token)</a:t>
+            </a:r>
+            <a:endParaRPr lang="en-US" dirty="0" smtClean="0"/>
           </a:p>
           <a:p>
             <a:pPr lvl="1"/>
             <a:r>
               <a:rPr lang="en-US" dirty="0" smtClean="0"/>
-              <a:t>Deck Building</a:t>
-            </a:r>
+              <a:t>Deck </a:t>
+            </a:r>
+            <a:r>
+              <a:rPr lang="en-US" dirty="0" smtClean="0"/>
+              <a:t>Building (Pool Building &amp; Card)</a:t>
+            </a:r>
+            <a:endParaRPr lang="en-US" dirty="0" smtClean="0"/>
           </a:p>
           <a:p>
             <a:pPr lvl="1"/>
             <a:r>
               <a:rPr lang="en-US" dirty="0" smtClean="0"/>
-              <a:t>Crayon Rail System</a:t>
-            </a:r>
+              <a:t>Crayon Rail </a:t>
+            </a:r>
+            <a:r>
+              <a:rPr lang="en-US" dirty="0" smtClean="0"/>
+              <a:t>System (Network Building &amp; Paper and pencil)</a:t>
+            </a:r>
+            <a:endParaRPr lang="en-US" dirty="0" smtClean="0"/>
           </a:p>
           <a:p>
             <a:r>
@@ -7064,7 +7079,7 @@
   <a:extraClrSchemeLst/>
   <a:extLst>
     <a:ext uri="{05A4C25C-085E-4340-85A3-A5531E510DB2}">
-      <thm15:themeFamily xmlns="" xmlns:thm15="http://schemas.microsoft.com/office/thememl/2012/main" name="Template Ludes.potx" id="{46A93FAF-1DBD-4E18-9B65-252654BA87DC}" vid="{3366FF25-CE61-4409-B912-537D68118A6E}"/>
+      <thm15:themeFamily xmlns:thm15="http://schemas.microsoft.com/office/thememl/2012/main" xmlns="" name="Template Ludes.potx" id="{46A93FAF-1DBD-4E18-9B65-252654BA87DC}" vid="{3366FF25-CE61-4409-B912-537D68118A6E}"/>
     </a:ext>
   </a:extLst>
 </a:theme>
@@ -7325,7 +7340,7 @@
   <a:extraClrSchemeLst/>
   <a:extLst>
     <a:ext uri="{05A4C25C-085E-4340-85A3-A5531E510DB2}">
-      <thm15:themeFamily xmlns="" xmlns:thm15="http://schemas.microsoft.com/office/thememl/2012/main" name="Office Theme" id="{62F939B6-93AF-4DB8-9C6B-D6C7DFDC589F}" vid="{4A3C46E8-61CC-4603-A589-7422A47A8E4A}"/>
+      <thm15:themeFamily xmlns:thm15="http://schemas.microsoft.com/office/thememl/2012/main" xmlns="" name="Office Theme" id="{62F939B6-93AF-4DB8-9C6B-D6C7DFDC589F}" vid="{4A3C46E8-61CC-4603-A589-7422A47A8E4A}"/>
     </a:ext>
   </a:extLst>
 </a:theme>

</xml_diff>

<commit_message>
Adição do logo da SBGames
</commit_message>
<xml_diff>
--- a/Artigos Apresentados/SBGames2017_Onthology.pptx
+++ b/Artigos Apresentados/SBGames2017_Onthology.pptx
@@ -142,7 +142,7 @@
       </p14:sectionLst>
     </p:ext>
     <p:ext uri="{EFAFB233-063F-42B5-8137-9DF3F51BA10A}">
-      <p15:sldGuideLst xmlns="" xmlns:p15="http://schemas.microsoft.com/office/powerpoint/2012/main">
+      <p15:sldGuideLst xmlns:p15="http://schemas.microsoft.com/office/powerpoint/2012/main" xmlns="">
         <p15:guide id="1" orient="horz" pos="2160" userDrawn="1">
           <p15:clr>
             <a:srgbClr val="A4A3A4"/>
@@ -4804,8 +4804,38 @@
         </p:blipFill>
         <p:spPr>
           <a:xfrm>
-            <a:off x="2314934" y="1967545"/>
+            <a:off x="1253309" y="1927860"/>
             <a:ext cx="4804064" cy="512108"/>
+          </a:xfrm>
+          <a:prstGeom prst="rect">
+            <a:avLst/>
+          </a:prstGeom>
+        </p:spPr>
+      </p:pic>
+      <p:pic>
+        <p:nvPicPr>
+          <p:cNvPr id="5" name="Picture 4" descr="sbgames2017.png"/>
+          <p:cNvPicPr>
+            <a:picLocks noChangeAspect="1"/>
+          </p:cNvPicPr>
+          <p:nvPr/>
+        </p:nvPicPr>
+        <p:blipFill>
+          <a:blip r:embed="rId3">
+            <a:extLst>
+              <a:ext uri="{28A0092B-C50C-407E-A947-70E740481C1C}">
+                <a14:useLocalDpi xmlns:a14="http://schemas.microsoft.com/office/drawing/2010/main" val="0"/>
+              </a:ext>
+            </a:extLst>
+          </a:blip>
+          <a:stretch>
+            <a:fillRect/>
+          </a:stretch>
+        </p:blipFill>
+        <p:spPr>
+          <a:xfrm>
+            <a:off x="6364041" y="1927365"/>
+            <a:ext cx="1856650" cy="510579"/>
           </a:xfrm>
           <a:prstGeom prst="rect">
             <a:avLst/>
@@ -4885,15 +4915,7 @@
           <a:p>
             <a:r>
               <a:rPr lang="en-US" dirty="0" smtClean="0"/>
-              <a:t>The </a:t>
-            </a:r>
-            <a:r>
-              <a:rPr lang="en-US" dirty="0" smtClean="0"/>
-              <a:t>Ontology </a:t>
-            </a:r>
-            <a:r>
-              <a:rPr lang="en-US" dirty="0" smtClean="0"/>
-              <a:t>must be improved</a:t>
+              <a:t>The Ontology must be improved</a:t>
             </a:r>
           </a:p>
           <a:p>
@@ -5491,29 +5513,13 @@
           <a:p>
             <a:r>
               <a:rPr lang="en-US" dirty="0" smtClean="0"/>
-              <a:t>Built a domain sub-</a:t>
-            </a:r>
+              <a:t>Built a domain sub-ontology from BGG database</a:t>
+            </a:r>
+          </a:p>
+          <a:p>
             <a:r>
               <a:rPr lang="en-US" dirty="0" smtClean="0"/>
-              <a:t>ontology </a:t>
-            </a:r>
-            <a:r>
-              <a:rPr lang="en-US" dirty="0" smtClean="0"/>
-              <a:t>from BGG database</a:t>
-            </a:r>
-          </a:p>
-          <a:p>
-            <a:r>
-              <a:rPr lang="en-US" dirty="0" smtClean="0"/>
-              <a:t>The </a:t>
-            </a:r>
-            <a:r>
-              <a:rPr lang="en-US" dirty="0" smtClean="0"/>
-              <a:t>ontology </a:t>
-            </a:r>
-            <a:r>
-              <a:rPr lang="en-US" dirty="0" smtClean="0"/>
-              <a:t>is not exhaustive</a:t>
+              <a:t>The ontology is not exhaustive</a:t>
             </a:r>
           </a:p>
           <a:p>
@@ -7064,7 +7070,7 @@
   <a:extraClrSchemeLst/>
   <a:extLst>
     <a:ext uri="{05A4C25C-085E-4340-85A3-A5531E510DB2}">
-      <thm15:themeFamily xmlns="" xmlns:thm15="http://schemas.microsoft.com/office/thememl/2012/main" name="Template Ludes.potx" id="{46A93FAF-1DBD-4E18-9B65-252654BA87DC}" vid="{3366FF25-CE61-4409-B912-537D68118A6E}"/>
+      <thm15:themeFamily xmlns:thm15="http://schemas.microsoft.com/office/thememl/2012/main" xmlns="" name="Template Ludes.potx" id="{46A93FAF-1DBD-4E18-9B65-252654BA87DC}" vid="{3366FF25-CE61-4409-B912-537D68118A6E}"/>
     </a:ext>
   </a:extLst>
 </a:theme>
@@ -7325,7 +7331,7 @@
   <a:extraClrSchemeLst/>
   <a:extLst>
     <a:ext uri="{05A4C25C-085E-4340-85A3-A5531E510DB2}">
-      <thm15:themeFamily xmlns="" xmlns:thm15="http://schemas.microsoft.com/office/thememl/2012/main" name="Office Theme" id="{62F939B6-93AF-4DB8-9C6B-D6C7DFDC589F}" vid="{4A3C46E8-61CC-4603-A589-7422A47A8E4A}"/>
+      <thm15:themeFamily xmlns:thm15="http://schemas.microsoft.com/office/thememl/2012/main" xmlns="" name="Office Theme" id="{62F939B6-93AF-4DB8-9C6B-D6C7DFDC589F}" vid="{4A3C46E8-61CC-4603-A589-7422A47A8E4A}"/>
     </a:ext>
   </a:extLst>
 </a:theme>

</xml_diff>